<commit_message>
18/02/25 practica 3 actualizada del 2
</commit_message>
<xml_diff>
--- a/Practica 2.pptx
+++ b/Practica 2.pptx
@@ -6,7 +6,8 @@
   </p:sldMasterIdLst>
   <p:sldIdLst>
     <p:sldId id="256" r:id="rId2"/>
-    <p:sldId id="257" r:id="rId3"/>
+    <p:sldId id="259" r:id="rId3"/>
+    <p:sldId id="258" r:id="rId4"/>
   </p:sldIdLst>
   <p:sldSz cx="12192000" cy="6858000"/>
   <p:notesSz cx="6858000" cy="9144000"/>
@@ -105,6 +106,11 @@
       </a:defRPr>
     </a:lvl9pPr>
   </p:defaultTextStyle>
+  <p:extLst>
+    <p:ext uri="{EFAFB233-063F-42B5-8137-9DF3F51BA10A}">
+      <p15:sldGuideLst xmlns:p15="http://schemas.microsoft.com/office/powerpoint/2012/main"/>
+    </p:ext>
+  </p:extLst>
 </p:presentation>
 </file>
 
@@ -294,7 +300,7 @@
           <a:p>
             <a:fld id="{7B3A182F-6A9E-4DE3-9DED-0088A3C16465}" type="datetimeFigureOut">
               <a:rPr lang="es-MX" smtClean="0"/>
-              <a:t>13/02/2025</a:t>
+              <a:t>18/02/2025</a:t>
             </a:fld>
             <a:endParaRPr lang="es-MX"/>
           </a:p>
@@ -569,7 +575,7 @@
           <a:p>
             <a:fld id="{7B3A182F-6A9E-4DE3-9DED-0088A3C16465}" type="datetimeFigureOut">
               <a:rPr lang="es-MX" smtClean="0"/>
-              <a:t>13/02/2025</a:t>
+              <a:t>18/02/2025</a:t>
             </a:fld>
             <a:endParaRPr lang="es-MX"/>
           </a:p>
@@ -763,7 +769,7 @@
           <a:p>
             <a:fld id="{7B3A182F-6A9E-4DE3-9DED-0088A3C16465}" type="datetimeFigureOut">
               <a:rPr lang="es-MX" smtClean="0"/>
-              <a:t>13/02/2025</a:t>
+              <a:t>18/02/2025</a:t>
             </a:fld>
             <a:endParaRPr lang="es-MX"/>
           </a:p>
@@ -1036,7 +1042,7 @@
           <a:p>
             <a:fld id="{7B3A182F-6A9E-4DE3-9DED-0088A3C16465}" type="datetimeFigureOut">
               <a:rPr lang="es-MX" smtClean="0"/>
-              <a:t>13/02/2025</a:t>
+              <a:t>18/02/2025</a:t>
             </a:fld>
             <a:endParaRPr lang="es-MX"/>
           </a:p>
@@ -1377,7 +1383,7 @@
           <a:p>
             <a:fld id="{7B3A182F-6A9E-4DE3-9DED-0088A3C16465}" type="datetimeFigureOut">
               <a:rPr lang="es-MX" smtClean="0"/>
-              <a:t>13/02/2025</a:t>
+              <a:t>18/02/2025</a:t>
             </a:fld>
             <a:endParaRPr lang="es-MX"/>
           </a:p>
@@ -2000,7 +2006,7 @@
           <a:p>
             <a:fld id="{7B3A182F-6A9E-4DE3-9DED-0088A3C16465}" type="datetimeFigureOut">
               <a:rPr lang="es-MX" smtClean="0"/>
-              <a:t>13/02/2025</a:t>
+              <a:t>18/02/2025</a:t>
             </a:fld>
             <a:endParaRPr lang="es-MX"/>
           </a:p>
@@ -2860,7 +2866,7 @@
           <a:p>
             <a:fld id="{7B3A182F-6A9E-4DE3-9DED-0088A3C16465}" type="datetimeFigureOut">
               <a:rPr lang="es-MX" smtClean="0"/>
-              <a:t>13/02/2025</a:t>
+              <a:t>18/02/2025</a:t>
             </a:fld>
             <a:endParaRPr lang="es-MX"/>
           </a:p>
@@ -3030,7 +3036,7 @@
           <a:p>
             <a:fld id="{7B3A182F-6A9E-4DE3-9DED-0088A3C16465}" type="datetimeFigureOut">
               <a:rPr lang="es-MX" smtClean="0"/>
-              <a:t>13/02/2025</a:t>
+              <a:t>18/02/2025</a:t>
             </a:fld>
             <a:endParaRPr lang="es-MX"/>
           </a:p>
@@ -3210,7 +3216,7 @@
           <a:p>
             <a:fld id="{7B3A182F-6A9E-4DE3-9DED-0088A3C16465}" type="datetimeFigureOut">
               <a:rPr lang="es-MX" smtClean="0"/>
-              <a:t>13/02/2025</a:t>
+              <a:t>18/02/2025</a:t>
             </a:fld>
             <a:endParaRPr lang="es-MX"/>
           </a:p>
@@ -3380,7 +3386,7 @@
           <a:p>
             <a:fld id="{7B3A182F-6A9E-4DE3-9DED-0088A3C16465}" type="datetimeFigureOut">
               <a:rPr lang="es-MX" smtClean="0"/>
-              <a:t>13/02/2025</a:t>
+              <a:t>18/02/2025</a:t>
             </a:fld>
             <a:endParaRPr lang="es-MX"/>
           </a:p>
@@ -3627,7 +3633,7 @@
           <a:p>
             <a:fld id="{7B3A182F-6A9E-4DE3-9DED-0088A3C16465}" type="datetimeFigureOut">
               <a:rPr lang="es-MX" smtClean="0"/>
-              <a:t>13/02/2025</a:t>
+              <a:t>18/02/2025</a:t>
             </a:fld>
             <a:endParaRPr lang="es-MX"/>
           </a:p>
@@ -3919,7 +3925,7 @@
           <a:p>
             <a:fld id="{7B3A182F-6A9E-4DE3-9DED-0088A3C16465}" type="datetimeFigureOut">
               <a:rPr lang="es-MX" smtClean="0"/>
-              <a:t>13/02/2025</a:t>
+              <a:t>18/02/2025</a:t>
             </a:fld>
             <a:endParaRPr lang="es-MX"/>
           </a:p>
@@ -4363,7 +4369,7 @@
           <a:p>
             <a:fld id="{7B3A182F-6A9E-4DE3-9DED-0088A3C16465}" type="datetimeFigureOut">
               <a:rPr lang="es-MX" smtClean="0"/>
-              <a:t>13/02/2025</a:t>
+              <a:t>18/02/2025</a:t>
             </a:fld>
             <a:endParaRPr lang="es-MX"/>
           </a:p>
@@ -4481,7 +4487,7 @@
           <a:p>
             <a:fld id="{7B3A182F-6A9E-4DE3-9DED-0088A3C16465}" type="datetimeFigureOut">
               <a:rPr lang="es-MX" smtClean="0"/>
-              <a:t>13/02/2025</a:t>
+              <a:t>18/02/2025</a:t>
             </a:fld>
             <a:endParaRPr lang="es-MX"/>
           </a:p>
@@ -4576,7 +4582,7 @@
           <a:p>
             <a:fld id="{7B3A182F-6A9E-4DE3-9DED-0088A3C16465}" type="datetimeFigureOut">
               <a:rPr lang="es-MX" smtClean="0"/>
-              <a:t>13/02/2025</a:t>
+              <a:t>18/02/2025</a:t>
             </a:fld>
             <a:endParaRPr lang="es-MX"/>
           </a:p>
@@ -4855,7 +4861,7 @@
           <a:p>
             <a:fld id="{7B3A182F-6A9E-4DE3-9DED-0088A3C16465}" type="datetimeFigureOut">
               <a:rPr lang="es-MX" smtClean="0"/>
-              <a:t>13/02/2025</a:t>
+              <a:t>18/02/2025</a:t>
             </a:fld>
             <a:endParaRPr lang="es-MX"/>
           </a:p>
@@ -5130,7 +5136,7 @@
           <a:p>
             <a:fld id="{7B3A182F-6A9E-4DE3-9DED-0088A3C16465}" type="datetimeFigureOut">
               <a:rPr lang="es-MX" smtClean="0"/>
-              <a:t>13/02/2025</a:t>
+              <a:t>18/02/2025</a:t>
             </a:fld>
             <a:endParaRPr lang="es-MX"/>
           </a:p>
@@ -5559,7 +5565,7 @@
           <a:p>
             <a:fld id="{7B3A182F-6A9E-4DE3-9DED-0088A3C16465}" type="datetimeFigureOut">
               <a:rPr lang="es-MX" smtClean="0"/>
-              <a:t>13/02/2025</a:t>
+              <a:t>18/02/2025</a:t>
             </a:fld>
             <a:endParaRPr lang="es-MX"/>
           </a:p>
@@ -6187,9 +6193,14 @@
           <a:bodyPr/>
           <a:lstStyle/>
           <a:p>
-            <a:r>
-              <a:rPr lang="es-MX" smtClean="0"/>
-              <a:t> </a:t>
+            <a:pPr algn="ctr"/>
+            <a:r>
+              <a:rPr lang="es-MX" dirty="0" smtClean="0"/>
+              <a:t>Mi </a:t>
+            </a:r>
+            <a:r>
+              <a:rPr lang="es-MX" dirty="0" err="1" smtClean="0"/>
+              <a:t>presentacion</a:t>
             </a:r>
             <a:endParaRPr lang="es-MX" dirty="0"/>
           </a:p>
@@ -6207,17 +6218,169 @@
         </p:nvSpPr>
         <p:spPr/>
         <p:txBody>
-          <a:bodyPr/>
+          <a:bodyPr>
+            <a:normAutofit/>
+          </a:bodyPr>
           <a:lstStyle/>
           <a:p>
-            <a:endParaRPr lang="es-MX"/>
+            <a:pPr algn="ctr"/>
+            <a:r>
+              <a:rPr lang="es-MX" sz="2800" dirty="0" smtClean="0"/>
+              <a:t>Me llamo Alan Eduardo </a:t>
+            </a:r>
+            <a:r>
+              <a:rPr lang="es-MX" sz="2800" dirty="0" err="1" smtClean="0"/>
+              <a:t>Leon</a:t>
+            </a:r>
+            <a:r>
+              <a:rPr lang="es-MX" sz="2800" dirty="0" smtClean="0"/>
+              <a:t> Merino vivo en </a:t>
+            </a:r>
+            <a:r>
+              <a:rPr lang="es-MX" sz="2800" dirty="0" err="1" smtClean="0"/>
+              <a:t>Culiacan</a:t>
+            </a:r>
+            <a:r>
+              <a:rPr lang="es-MX" sz="2800" dirty="0" smtClean="0"/>
+              <a:t>, Sinaloa pero tengo a toda mi familia  en Oaxaca y me gusta estar allá por que la paso con </a:t>
+            </a:r>
+            <a:r>
+              <a:rPr lang="es-MX" sz="2800" smtClean="0"/>
+              <a:t>mi familia </a:t>
+            </a:r>
+            <a:r>
+              <a:rPr lang="es-MX" sz="2800" dirty="0" smtClean="0"/>
+              <a:t>y me divierto cuando la paso allá tengo 15 años y todavía no se usar una computadora correctamente y me gustaría aprender mas sobre la programación.</a:t>
+            </a:r>
+            <a:endParaRPr lang="es-MX" sz="2800" dirty="0"/>
           </a:p>
         </p:txBody>
       </p:sp>
     </p:spTree>
     <p:extLst>
       <p:ext uri="{BB962C8B-B14F-4D97-AF65-F5344CB8AC3E}">
-        <p14:creationId xmlns:p14="http://schemas.microsoft.com/office/powerpoint/2010/main" val="3649036520"/>
+        <p14:creationId xmlns:p14="http://schemas.microsoft.com/office/powerpoint/2010/main" val="1318011399"/>
+      </p:ext>
+    </p:extLst>
+  </p:cSld>
+  <p:clrMapOvr>
+    <a:masterClrMapping/>
+  </p:clrMapOvr>
+</p:sld>
+</file>
+
+<file path=ppt/slides/slide3.xml><?xml version="1.0" encoding="utf-8"?>
+<p:sld xmlns:a="http://schemas.openxmlformats.org/drawingml/2006/main" xmlns:r="http://schemas.openxmlformats.org/officeDocument/2006/relationships" xmlns:p="http://schemas.openxmlformats.org/presentationml/2006/main">
+  <p:cSld>
+    <p:spTree>
+      <p:nvGrpSpPr>
+        <p:cNvPr id="1" name=""/>
+        <p:cNvGrpSpPr/>
+        <p:nvPr/>
+      </p:nvGrpSpPr>
+      <p:grpSpPr>
+        <a:xfrm>
+          <a:off x="0" y="0"/>
+          <a:ext cx="0" cy="0"/>
+          <a:chOff x="0" y="0"/>
+          <a:chExt cx="0" cy="0"/>
+        </a:xfrm>
+      </p:grpSpPr>
+      <p:sp>
+        <p:nvSpPr>
+          <p:cNvPr id="2" name="Título 1"/>
+          <p:cNvSpPr>
+            <a:spLocks noGrp="1"/>
+          </p:cNvSpPr>
+          <p:nvPr>
+            <p:ph type="title"/>
+          </p:nvPr>
+        </p:nvSpPr>
+        <p:spPr/>
+        <p:txBody>
+          <a:bodyPr/>
+          <a:lstStyle/>
+          <a:p>
+            <a:pPr algn="ctr"/>
+            <a:r>
+              <a:rPr lang="es-MX" dirty="0" smtClean="0"/>
+              <a:t> Cosas que me gustan</a:t>
+            </a:r>
+            <a:endParaRPr lang="es-MX" dirty="0"/>
+          </a:p>
+        </p:txBody>
+      </p:sp>
+      <p:sp>
+        <p:nvSpPr>
+          <p:cNvPr id="3" name="Marcador de contenido 2"/>
+          <p:cNvSpPr>
+            <a:spLocks noGrp="1"/>
+          </p:cNvSpPr>
+          <p:nvPr>
+            <p:ph idx="1"/>
+          </p:nvPr>
+        </p:nvSpPr>
+        <p:spPr>
+          <a:xfrm>
+            <a:off x="352697" y="627018"/>
+            <a:ext cx="11403873" cy="5621382"/>
+          </a:xfrm>
+        </p:spPr>
+        <p:txBody>
+          <a:bodyPr/>
+          <a:lstStyle/>
+          <a:p>
+            <a:pPr marL="0" indent="0">
+              <a:buNone/>
+            </a:pPr>
+            <a:endParaRPr lang="es-MX" sz="3200" dirty="0" smtClean="0"/>
+          </a:p>
+          <a:p>
+            <a:r>
+              <a:rPr lang="es-MX" sz="3200" dirty="0"/>
+              <a:t> </a:t>
+            </a:r>
+            <a:r>
+              <a:rPr lang="es-MX" sz="3200" dirty="0" smtClean="0"/>
+              <a:t>Me gusta la comida como el pozole , las </a:t>
+            </a:r>
+            <a:r>
+              <a:rPr lang="es-MX" sz="3200" dirty="0" err="1" smtClean="0"/>
+              <a:t>tlayudas</a:t>
+            </a:r>
+            <a:r>
+              <a:rPr lang="es-MX" sz="3200" dirty="0" smtClean="0"/>
+              <a:t>, los huaraches de Oaxaca.</a:t>
+            </a:r>
+            <a:endParaRPr lang="es-MX" sz="3200" dirty="0"/>
+          </a:p>
+          <a:p>
+            <a:r>
+              <a:rPr lang="es-MX" sz="3200" dirty="0" smtClean="0"/>
+              <a:t>Me gusta dormir o descansar después de una actividad física y me toma mucho tiempo.</a:t>
+            </a:r>
+          </a:p>
+          <a:p>
+            <a:r>
+              <a:rPr lang="es-MX" sz="3200" dirty="0" smtClean="0"/>
+              <a:t>Me gusta las películas de acción o de suspenso.</a:t>
+            </a:r>
+          </a:p>
+          <a:p>
+            <a:r>
+              <a:rPr lang="es-MX" sz="3200" dirty="0" smtClean="0"/>
+              <a:t>No me gusta tanto leer, pero si leo me gustan de finanzas o de terror.</a:t>
+            </a:r>
+          </a:p>
+          <a:p>
+            <a:endParaRPr lang="es-MX" sz="3200" dirty="0"/>
+          </a:p>
+        </p:txBody>
+      </p:sp>
+    </p:spTree>
+    <p:extLst>
+      <p:ext uri="{BB962C8B-B14F-4D97-AF65-F5344CB8AC3E}">
+        <p14:creationId xmlns:p14="http://schemas.microsoft.com/office/powerpoint/2010/main" val="1090607915"/>
       </p:ext>
     </p:extLst>
   </p:cSld>

</xml_diff>